<commit_message>
add list email python code NIST case
</commit_message>
<xml_diff>
--- a/NIST_Data_Leakage_Case/NIST_Data_Leakage_04_Email_USB_Python.pptx
+++ b/NIST_Data_Leakage_Case/NIST_Data_Leakage_04_Email_USB_Python.pptx
@@ -129,7 +129,7 @@
 <file path=ppt/revisionInfo.xml><?xml version="1.0" encoding="utf-8"?>
 <p1510:revInfo xmlns:a="http://schemas.openxmlformats.org/drawingml/2006/main" xmlns:r="http://schemas.openxmlformats.org/officeDocument/2006/relationships" xmlns:p1510="http://schemas.microsoft.com/office/powerpoint/2015/10/main">
   <p1510:revLst>
-    <p1510:client id="{EACFD935-34A8-432D-B1C5-669A6BED25B6}" v="6" dt="2023-10-06T01:26:59.286"/>
+    <p1510:client id="{EACFD935-34A8-432D-B1C5-669A6BED25B6}" v="15" dt="2023-10-18T19:05:29.376"/>
   </p1510:revLst>
 </p1510:revInfo>
 </file>
@@ -2794,7 +2794,7 @@
   <pc:docChgLst>
     <pc:chgData name="Weifeng Xu" userId="e7aed605-a3dd-4d5a-a692-a87037af107b" providerId="ADAL" clId="{EACFD935-34A8-432D-B1C5-669A6BED25B6}"/>
     <pc:docChg chg="undo custSel addSld delSld modSld sldOrd">
-      <pc:chgData name="Weifeng Xu" userId="e7aed605-a3dd-4d5a-a692-a87037af107b" providerId="ADAL" clId="{EACFD935-34A8-432D-B1C5-669A6BED25B6}" dt="2023-10-06T01:27:11.311" v="610" actId="20577"/>
+      <pc:chgData name="Weifeng Xu" userId="e7aed605-a3dd-4d5a-a692-a87037af107b" providerId="ADAL" clId="{EACFD935-34A8-432D-B1C5-669A6BED25B6}" dt="2023-10-18T19:05:29.376" v="640"/>
       <pc:docMkLst>
         <pc:docMk/>
       </pc:docMkLst>
@@ -3155,7 +3155,7 @@
         </pc:picChg>
       </pc:sldChg>
       <pc:sldChg chg="addSp delSp modSp new mod ord modNotesTx">
-        <pc:chgData name="Weifeng Xu" userId="e7aed605-a3dd-4d5a-a692-a87037af107b" providerId="ADAL" clId="{EACFD935-34A8-432D-B1C5-669A6BED25B6}" dt="2023-10-06T01:23:46.941" v="499" actId="14100"/>
+        <pc:chgData name="Weifeng Xu" userId="e7aed605-a3dd-4d5a-a692-a87037af107b" providerId="ADAL" clId="{EACFD935-34A8-432D-B1C5-669A6BED25B6}" dt="2023-10-18T19:05:29.376" v="640"/>
         <pc:sldMkLst>
           <pc:docMk/>
           <pc:sldMk cId="1126431689" sldId="368"/>
@@ -3184,9 +3184,17 @@
             <ac:picMk id="5" creationId="{3F4F14A3-9641-82AC-D7DD-2C9366BA06CA}"/>
           </ac:picMkLst>
         </pc:picChg>
+        <pc:picChg chg="add mod">
+          <ac:chgData name="Weifeng Xu" userId="e7aed605-a3dd-4d5a-a692-a87037af107b" providerId="ADAL" clId="{EACFD935-34A8-432D-B1C5-669A6BED25B6}" dt="2023-10-18T19:05:29.376" v="640"/>
+          <ac:picMkLst>
+            <pc:docMk/>
+            <pc:sldMk cId="1126431689" sldId="368"/>
+            <ac:picMk id="2050" creationId="{1D0C2E96-2553-891D-3D07-9FA401A1EA3C}"/>
+          </ac:picMkLst>
+        </pc:picChg>
       </pc:sldChg>
       <pc:sldChg chg="addSp modSp new mod ord modNotesTx">
-        <pc:chgData name="Weifeng Xu" userId="e7aed605-a3dd-4d5a-a692-a87037af107b" providerId="ADAL" clId="{EACFD935-34A8-432D-B1C5-669A6BED25B6}" dt="2023-10-06T01:26:48.007" v="591" actId="2711"/>
+        <pc:chgData name="Weifeng Xu" userId="e7aed605-a3dd-4d5a-a692-a87037af107b" providerId="ADAL" clId="{EACFD935-34A8-432D-B1C5-669A6BED25B6}" dt="2023-10-18T19:04:49.541" v="636"/>
         <pc:sldMkLst>
           <pc:docMk/>
           <pc:sldMk cId="1096637408" sldId="369"/>
@@ -3207,9 +3215,17 @@
             <ac:picMk id="3" creationId="{D50D6238-5ECB-E89B-F5A1-70CE128B61FF}"/>
           </ac:picMkLst>
         </pc:picChg>
-      </pc:sldChg>
-      <pc:sldChg chg="addSp modSp new mod">
-        <pc:chgData name="Weifeng Xu" userId="e7aed605-a3dd-4d5a-a692-a87037af107b" providerId="ADAL" clId="{EACFD935-34A8-432D-B1C5-669A6BED25B6}" dt="2023-10-06T01:27:11.311" v="610" actId="20577"/>
+        <pc:picChg chg="add mod">
+          <ac:chgData name="Weifeng Xu" userId="e7aed605-a3dd-4d5a-a692-a87037af107b" providerId="ADAL" clId="{EACFD935-34A8-432D-B1C5-669A6BED25B6}" dt="2023-10-18T19:04:49.541" v="636"/>
+          <ac:picMkLst>
+            <pc:docMk/>
+            <pc:sldMk cId="1096637408" sldId="369"/>
+            <ac:picMk id="1026" creationId="{3224168B-75A6-08C0-9A59-1B9C0CF84CA2}"/>
+          </ac:picMkLst>
+        </pc:picChg>
+      </pc:sldChg>
+      <pc:sldChg chg="addSp modSp new mod modNotesTx">
+        <pc:chgData name="Weifeng Xu" userId="e7aed605-a3dd-4d5a-a692-a87037af107b" providerId="ADAL" clId="{EACFD935-34A8-432D-B1C5-669A6BED25B6}" dt="2023-10-18T19:03:30.893" v="631" actId="6549"/>
         <pc:sldMkLst>
           <pc:docMk/>
           <pc:sldMk cId="3500427538" sldId="370"/>
@@ -3388,7 +3404,7 @@
           <a:p>
             <a:fld id="{EE41F6E3-57F9-402E-BDBA-5B2DE11C8530}" type="datetimeFigureOut">
               <a:rPr lang="en-US" smtClean="0"/>
-              <a:t>10/5/2023</a:t>
+              <a:t>10/18/2023</a:t>
             </a:fld>
             <a:endParaRPr lang="en-US"/>
           </a:p>
@@ -4962,6 +4978,93 @@
 </p:notes>
 </file>
 
+<file path=ppt/notesSlides/notesSlide7.xml><?xml version="1.0" encoding="utf-8"?>
+<p:notes xmlns:a="http://schemas.openxmlformats.org/drawingml/2006/main" xmlns:r="http://schemas.openxmlformats.org/officeDocument/2006/relationships" xmlns:p="http://schemas.openxmlformats.org/presentationml/2006/main">
+  <p:cSld>
+    <p:spTree>
+      <p:nvGrpSpPr>
+        <p:cNvPr id="1" name=""/>
+        <p:cNvGrpSpPr/>
+        <p:nvPr/>
+      </p:nvGrpSpPr>
+      <p:grpSpPr>
+        <a:xfrm>
+          <a:off x="0" y="0"/>
+          <a:ext cx="0" cy="0"/>
+          <a:chOff x="0" y="0"/>
+          <a:chExt cx="0" cy="0"/>
+        </a:xfrm>
+      </p:grpSpPr>
+      <p:sp>
+        <p:nvSpPr>
+          <p:cNvPr id="2" name="Slide Image Placeholder 1"/>
+          <p:cNvSpPr>
+            <a:spLocks noGrp="1" noRot="1" noChangeAspect="1"/>
+          </p:cNvSpPr>
+          <p:nvPr>
+            <p:ph type="sldImg"/>
+          </p:nvPr>
+        </p:nvSpPr>
+        <p:spPr/>
+      </p:sp>
+      <p:sp>
+        <p:nvSpPr>
+          <p:cNvPr id="3" name="Notes Placeholder 2"/>
+          <p:cNvSpPr>
+            <a:spLocks noGrp="1"/>
+          </p:cNvSpPr>
+          <p:nvPr>
+            <p:ph type="body" idx="1"/>
+          </p:nvPr>
+        </p:nvSpPr>
+        <p:spPr/>
+        <p:txBody>
+          <a:bodyPr/>
+          <a:lstStyle/>
+          <a:p>
+            <a:r>
+              <a:rPr lang="en-US" dirty="0"/>
+              <a:t>https://raw.githubusercontent.com/frankwxu/digital-forensics-lab/main/NIST_Data_Leakage_Case/py_version/pycode/email/list_emails.ipynb</a:t>
+            </a:r>
+          </a:p>
+        </p:txBody>
+      </p:sp>
+      <p:sp>
+        <p:nvSpPr>
+          <p:cNvPr id="4" name="Slide Number Placeholder 3"/>
+          <p:cNvSpPr>
+            <a:spLocks noGrp="1"/>
+          </p:cNvSpPr>
+          <p:nvPr>
+            <p:ph type="sldNum" sz="quarter" idx="5"/>
+          </p:nvPr>
+        </p:nvSpPr>
+        <p:spPr/>
+        <p:txBody>
+          <a:bodyPr/>
+          <a:lstStyle/>
+          <a:p>
+            <a:fld id="{DDBF98C7-164A-4723-84F0-B1E4B080DDEC}" type="slidenum">
+              <a:rPr lang="en-US" smtClean="0"/>
+              <a:t>12</a:t>
+            </a:fld>
+            <a:endParaRPr lang="en-US"/>
+          </a:p>
+        </p:txBody>
+      </p:sp>
+    </p:spTree>
+    <p:extLst>
+      <p:ext uri="{BB962C8B-B14F-4D97-AF65-F5344CB8AC3E}">
+        <p14:creationId xmlns:p14="http://schemas.microsoft.com/office/powerpoint/2010/main" val="225868614"/>
+      </p:ext>
+    </p:extLst>
+  </p:cSld>
+  <p:clrMapOvr>
+    <a:masterClrMapping/>
+  </p:clrMapOvr>
+</p:notes>
+</file>
+
 <file path=ppt/slideLayouts/slideLayout1.xml><?xml version="1.0" encoding="utf-8"?>
 <p:sldLayout xmlns:a="http://schemas.openxmlformats.org/drawingml/2006/main" xmlns:r="http://schemas.openxmlformats.org/officeDocument/2006/relationships" xmlns:p="http://schemas.openxmlformats.org/presentationml/2006/main" type="title" preserve="1">
   <p:cSld name="Title Slide">
@@ -5091,7 +5194,7 @@
           <a:p>
             <a:fld id="{4263717A-E3C1-4BED-ABE0-B7069385E023}" type="datetimeFigureOut">
               <a:rPr lang="en-US" smtClean="0"/>
-              <a:t>10/5/2023</a:t>
+              <a:t>10/18/2023</a:t>
             </a:fld>
             <a:endParaRPr lang="en-US"/>
           </a:p>
@@ -5264,7 +5367,7 @@
           <a:p>
             <a:fld id="{4263717A-E3C1-4BED-ABE0-B7069385E023}" type="datetimeFigureOut">
               <a:rPr lang="en-US" smtClean="0"/>
-              <a:t>10/5/2023</a:t>
+              <a:t>10/18/2023</a:t>
             </a:fld>
             <a:endParaRPr lang="en-US"/>
           </a:p>
@@ -5442,7 +5545,7 @@
           <a:p>
             <a:fld id="{4263717A-E3C1-4BED-ABE0-B7069385E023}" type="datetimeFigureOut">
               <a:rPr lang="en-US" smtClean="0"/>
-              <a:t>10/5/2023</a:t>
+              <a:t>10/18/2023</a:t>
             </a:fld>
             <a:endParaRPr lang="en-US"/>
           </a:p>
@@ -5610,7 +5713,7 @@
           <a:p>
             <a:fld id="{4263717A-E3C1-4BED-ABE0-B7069385E023}" type="datetimeFigureOut">
               <a:rPr lang="en-US" smtClean="0"/>
-              <a:t>10/5/2023</a:t>
+              <a:t>10/18/2023</a:t>
             </a:fld>
             <a:endParaRPr lang="en-US"/>
           </a:p>
@@ -5855,7 +5958,7 @@
           <a:p>
             <a:fld id="{4263717A-E3C1-4BED-ABE0-B7069385E023}" type="datetimeFigureOut">
               <a:rPr lang="en-US" smtClean="0"/>
-              <a:t>10/5/2023</a:t>
+              <a:t>10/18/2023</a:t>
             </a:fld>
             <a:endParaRPr lang="en-US"/>
           </a:p>
@@ -6084,7 +6187,7 @@
           <a:p>
             <a:fld id="{4263717A-E3C1-4BED-ABE0-B7069385E023}" type="datetimeFigureOut">
               <a:rPr lang="en-US" smtClean="0"/>
-              <a:t>10/5/2023</a:t>
+              <a:t>10/18/2023</a:t>
             </a:fld>
             <a:endParaRPr lang="en-US"/>
           </a:p>
@@ -6448,7 +6551,7 @@
           <a:p>
             <a:fld id="{4263717A-E3C1-4BED-ABE0-B7069385E023}" type="datetimeFigureOut">
               <a:rPr lang="en-US" smtClean="0"/>
-              <a:t>10/5/2023</a:t>
+              <a:t>10/18/2023</a:t>
             </a:fld>
             <a:endParaRPr lang="en-US"/>
           </a:p>
@@ -6565,7 +6668,7 @@
           <a:p>
             <a:fld id="{4263717A-E3C1-4BED-ABE0-B7069385E023}" type="datetimeFigureOut">
               <a:rPr lang="en-US" smtClean="0"/>
-              <a:t>10/5/2023</a:t>
+              <a:t>10/18/2023</a:t>
             </a:fld>
             <a:endParaRPr lang="en-US"/>
           </a:p>
@@ -6660,7 +6763,7 @@
           <a:p>
             <a:fld id="{4263717A-E3C1-4BED-ABE0-B7069385E023}" type="datetimeFigureOut">
               <a:rPr lang="en-US" smtClean="0"/>
-              <a:t>10/5/2023</a:t>
+              <a:t>10/18/2023</a:t>
             </a:fld>
             <a:endParaRPr lang="en-US"/>
           </a:p>
@@ -6935,7 +7038,7 @@
           <a:p>
             <a:fld id="{4263717A-E3C1-4BED-ABE0-B7069385E023}" type="datetimeFigureOut">
               <a:rPr lang="en-US" smtClean="0"/>
-              <a:t>10/5/2023</a:t>
+              <a:t>10/18/2023</a:t>
             </a:fld>
             <a:endParaRPr lang="en-US"/>
           </a:p>
@@ -7187,7 +7290,7 @@
           <a:p>
             <a:fld id="{4263717A-E3C1-4BED-ABE0-B7069385E023}" type="datetimeFigureOut">
               <a:rPr lang="en-US" smtClean="0"/>
-              <a:t>10/5/2023</a:t>
+              <a:t>10/18/2023</a:t>
             </a:fld>
             <a:endParaRPr lang="en-US"/>
           </a:p>
@@ -7398,7 +7501,7 @@
           <a:p>
             <a:fld id="{4263717A-E3C1-4BED-ABE0-B7069385E023}" type="datetimeFigureOut">
               <a:rPr lang="en-US" smtClean="0"/>
-              <a:t>10/5/2023</a:t>
+              <a:t>10/18/2023</a:t>
             </a:fld>
             <a:endParaRPr lang="en-US"/>
           </a:p>
@@ -8136,6 +8239,54 @@
           </a:p>
         </p:txBody>
       </p:sp>
+      <p:pic>
+        <p:nvPicPr>
+          <p:cNvPr id="2050" name="Picture 2" descr="Download - Free arrows icons">
+            <a:hlinkClick r:id="rId4"/>
+            <a:extLst>
+              <a:ext uri="{FF2B5EF4-FFF2-40B4-BE49-F238E27FC236}">
+                <a16:creationId xmlns:a16="http://schemas.microsoft.com/office/drawing/2014/main" id="{1D0C2E96-2553-891D-3D07-9FA401A1EA3C}"/>
+              </a:ext>
+            </a:extLst>
+          </p:cNvPr>
+          <p:cNvPicPr>
+            <a:picLocks noChangeAspect="1" noChangeArrowheads="1"/>
+          </p:cNvPicPr>
+          <p:nvPr/>
+        </p:nvPicPr>
+        <p:blipFill>
+          <a:blip r:embed="rId5">
+            <a:extLst>
+              <a:ext uri="{28A0092B-C50C-407E-A947-70E740481C1C}">
+                <a14:useLocalDpi xmlns:a14="http://schemas.microsoft.com/office/drawing/2010/main" val="0"/>
+              </a:ext>
+            </a:extLst>
+          </a:blip>
+          <a:srcRect/>
+          <a:stretch>
+            <a:fillRect/>
+          </a:stretch>
+        </p:blipFill>
+        <p:spPr bwMode="auto">
+          <a:xfrm flipH="1">
+            <a:off x="2294467" y="3759200"/>
+            <a:ext cx="1007533" cy="1007533"/>
+          </a:xfrm>
+          <a:prstGeom prst="rect">
+            <a:avLst/>
+          </a:prstGeom>
+          <a:noFill/>
+          <a:extLst>
+            <a:ext uri="{909E8E84-426E-40DD-AFC4-6F175D3DCCD1}">
+              <a14:hiddenFill xmlns:a14="http://schemas.microsoft.com/office/drawing/2010/main">
+                <a:solidFill>
+                  <a:srgbClr val="FFFFFF"/>
+                </a:solidFill>
+              </a14:hiddenFill>
+            </a:ext>
+          </a:extLst>
+        </p:spPr>
+      </p:pic>
     </p:spTree>
     <p:extLst>
       <p:ext uri="{BB962C8B-B14F-4D97-AF65-F5344CB8AC3E}">
@@ -8251,6 +8402,54 @@
           </a:p>
         </p:txBody>
       </p:sp>
+      <p:pic>
+        <p:nvPicPr>
+          <p:cNvPr id="1026" name="Picture 2" descr="Download - Free arrows icons">
+            <a:hlinkClick r:id="rId4"/>
+            <a:extLst>
+              <a:ext uri="{FF2B5EF4-FFF2-40B4-BE49-F238E27FC236}">
+                <a16:creationId xmlns:a16="http://schemas.microsoft.com/office/drawing/2014/main" id="{3224168B-75A6-08C0-9A59-1B9C0CF84CA2}"/>
+              </a:ext>
+            </a:extLst>
+          </p:cNvPr>
+          <p:cNvPicPr>
+            <a:picLocks noChangeAspect="1" noChangeArrowheads="1"/>
+          </p:cNvPicPr>
+          <p:nvPr/>
+        </p:nvPicPr>
+        <p:blipFill>
+          <a:blip r:embed="rId5">
+            <a:extLst>
+              <a:ext uri="{28A0092B-C50C-407E-A947-70E740481C1C}">
+                <a14:useLocalDpi xmlns:a14="http://schemas.microsoft.com/office/drawing/2010/main" val="0"/>
+              </a:ext>
+            </a:extLst>
+          </a:blip>
+          <a:srcRect/>
+          <a:stretch>
+            <a:fillRect/>
+          </a:stretch>
+        </p:blipFill>
+        <p:spPr bwMode="auto">
+          <a:xfrm>
+            <a:off x="1684868" y="4021667"/>
+            <a:ext cx="880532" cy="880532"/>
+          </a:xfrm>
+          <a:prstGeom prst="rect">
+            <a:avLst/>
+          </a:prstGeom>
+          <a:noFill/>
+          <a:extLst>
+            <a:ext uri="{909E8E84-426E-40DD-AFC4-6F175D3DCCD1}">
+              <a14:hiddenFill xmlns:a14="http://schemas.microsoft.com/office/drawing/2010/main">
+                <a:solidFill>
+                  <a:srgbClr val="FFFFFF"/>
+                </a:solidFill>
+              </a14:hiddenFill>
+            </a:ext>
+          </a:extLst>
+        </p:spPr>
+      </p:pic>
     </p:spTree>
     <p:extLst>
       <p:ext uri="{BB962C8B-B14F-4D97-AF65-F5344CB8AC3E}">
@@ -8296,7 +8495,7 @@
           <p:nvPr/>
         </p:nvPicPr>
         <p:blipFill>
-          <a:blip r:embed="rId2"/>
+          <a:blip r:embed="rId3"/>
           <a:stretch>
             <a:fillRect/>
           </a:stretch>
@@ -8326,7 +8525,7 @@
           <p:nvPr/>
         </p:nvPicPr>
         <p:blipFill>
-          <a:blip r:embed="rId3"/>
+          <a:blip r:embed="rId4"/>
           <a:stretch>
             <a:fillRect/>
           </a:stretch>

</xml_diff>